<commit_message>
Minor updates to lec-25 slides
</commit_message>
<xml_diff>
--- a/tyler/meena/cs220/f21/materials/lec_25_F21.pptx
+++ b/tyler/meena/cs220/f21/materials/lec_25_F21.pptx
@@ -4111,6 +4111,18 @@
             </a:r>
           </a:p>
           <a:p>
+            <a:pPr marL="635000" indent="-444500">
+              <a:spcBef>
+                <a:spcPts val="0"/>
+              </a:spcBef>
+              <a:defRPr sz="2800"/>
+            </a:pPr>
+            <a:r>
+              <a:rPr lang="en-US" dirty="0"/>
+              <a:t>the scary vocabulary of iteration</a:t>
+            </a:r>
+          </a:p>
+          <a:p>
             <a:pPr marL="1079500" lvl="1" indent="-444500">
               <a:spcBef>
                 <a:spcPts val="0"/>
@@ -4120,18 +4132,6 @@
             <a:r>
               <a:rPr lang="en-US" dirty="0"/>
               <a:t>notebook examples</a:t>
-            </a:r>
-          </a:p>
-          <a:p>
-            <a:pPr marL="635000" indent="-444500">
-              <a:spcBef>
-                <a:spcPts val="0"/>
-              </a:spcBef>
-              <a:defRPr sz="2800"/>
-            </a:pPr>
-            <a:r>
-              <a:rPr lang="en-US" dirty="0"/>
-              <a:t>comprehensions</a:t>
             </a:r>
           </a:p>
           <a:p>
@@ -4712,6 +4712,11 @@
               <a:rPr dirty="0"/>
               <a:t>Iterators</a:t>
             </a:r>
+            <a:r>
+              <a:rPr lang="en-US" dirty="0"/>
+              <a:t> and comprehensions</a:t>
+            </a:r>
+            <a:endParaRPr dirty="0"/>
           </a:p>
         </p:txBody>
       </p:sp>
@@ -4793,6 +4798,18 @@
             <a:r>
               <a:rPr lang="en-US" dirty="0"/>
               <a:t>sorted / .sort() + lambda</a:t>
+            </a:r>
+          </a:p>
+          <a:p>
+            <a:pPr marL="635000" indent="-444500">
+              <a:spcBef>
+                <a:spcPts val="0"/>
+              </a:spcBef>
+              <a:defRPr sz="2800"/>
+            </a:pPr>
+            <a:r>
+              <a:rPr lang="en-US" dirty="0"/>
+              <a:t>the scary vocabulary of iteration</a:t>
             </a:r>
           </a:p>
           <a:p>
@@ -6603,6 +6620,11 @@
               <a:rPr dirty="0"/>
               <a:t>Iterators</a:t>
             </a:r>
+            <a:r>
+              <a:rPr lang="en-US" dirty="0"/>
+              <a:t> and comprehensions</a:t>
+            </a:r>
+            <a:endParaRPr dirty="0"/>
           </a:p>
         </p:txBody>
       </p:sp>
@@ -6683,7 +6705,7 @@
             </a:pPr>
             <a:r>
               <a:rPr lang="en-US" dirty="0"/>
-              <a:t>map + lambda</a:t>
+              <a:t>sorted / .sort() + lambda</a:t>
             </a:r>
           </a:p>
           <a:p>
@@ -6702,7 +6724,11 @@
               </a:defRPr>
             </a:pPr>
             <a:r>
-              <a:rPr dirty="0"/>
+              <a:rPr dirty="0">
+                <a:solidFill>
+                  <a:srgbClr val="FF0000"/>
+                </a:solidFill>
+              </a:rPr>
               <a:t>the scary vocabulary of iteration</a:t>
             </a:r>
           </a:p>
@@ -6714,7 +6740,11 @@
               <a:defRPr sz="2800"/>
             </a:pPr>
             <a:r>
-              <a:rPr lang="en-US" dirty="0"/>
+              <a:rPr lang="en-US" dirty="0">
+                <a:solidFill>
+                  <a:srgbClr val="FF0000"/>
+                </a:solidFill>
+              </a:rPr>
               <a:t>notebook examples</a:t>
             </a:r>
           </a:p>

</xml_diff>